<commit_message>
took pptx out of master mode
</commit_message>
<xml_diff>
--- a/filesets/autotune/autotune_check.pptx
+++ b/filesets/autotune/autotune_check.pptx
@@ -234,7 +234,7 @@
               <a:rPr lang="en-US" smtClean="0">
                 <a:latin typeface="Arial Regular"/>
               </a:rPr>
-              <a:t>8/3/20</a:t>
+              <a:t>8/24/20</a:t>
             </a:fld>
             <a:endParaRPr lang="en-US" dirty="0">
               <a:latin typeface="Arial Regular"/>
@@ -424,7 +424,7 @@
             <a:fld id="{C7103FDF-5845-2441-8890-D723FF5A85D0}" type="datetimeFigureOut">
               <a:rPr lang="en-US" smtClean="0"/>
               <a:pPr/>
-              <a:t>8/3/20</a:t>
+              <a:t>8/24/20</a:t>
             </a:fld>
             <a:endParaRPr lang="en-US" dirty="0"/>
           </a:p>
@@ -6277,9 +6277,12 @@
 </file>
 
 <file path=customXml/item1.xml><?xml version="1.0" encoding="utf-8"?>
-<p:properties xmlns:p="http://schemas.microsoft.com/office/2006/metadata/properties" xmlns:xsi="http://www.w3.org/2001/XMLSchema-instance" xmlns:pc="http://schemas.microsoft.com/office/infopath/2007/PartnerControls">
-  <documentManagement/>
-</p:properties>
+<?mso-contentType ?>
+<FormTemplates xmlns="http://schemas.microsoft.com/sharepoint/v3/contenttype/forms">
+  <Display>DocumentLibraryForm</Display>
+  <Edit>DocumentLibraryForm</Edit>
+  <New>DocumentLibraryForm</New>
+</FormTemplates>
 </file>
 
 <file path=customXml/item2.xml><?xml version="1.0" encoding="utf-8"?>
@@ -6397,27 +6400,15 @@
 </file>
 
 <file path=customXml/item3.xml><?xml version="1.0" encoding="utf-8"?>
-<?mso-contentType ?>
-<FormTemplates xmlns="http://schemas.microsoft.com/sharepoint/v3/contenttype/forms">
-  <Display>DocumentLibraryForm</Display>
-  <Edit>DocumentLibraryForm</Edit>
-  <New>DocumentLibraryForm</New>
-</FormTemplates>
+<p:properties xmlns:p="http://schemas.microsoft.com/office/2006/metadata/properties" xmlns:xsi="http://www.w3.org/2001/XMLSchema-instance" xmlns:pc="http://schemas.microsoft.com/office/infopath/2007/PartnerControls">
+  <documentManagement/>
+</p:properties>
 </file>
 
 <file path=customXml/itemProps1.xml><?xml version="1.0" encoding="utf-8"?>
-<ds:datastoreItem xmlns:ds="http://schemas.openxmlformats.org/officeDocument/2006/customXml" ds:itemID="{19C64E80-8200-4669-BC3C-EA57A9064010}">
+<ds:datastoreItem xmlns:ds="http://schemas.openxmlformats.org/officeDocument/2006/customXml" ds:itemID="{D03F60F6-267C-4F0B-90AC-53495EF22DB8}">
   <ds:schemaRefs>
-    <ds:schemaRef ds:uri="http://schemas.microsoft.com/office/infopath/2007/PartnerControls"/>
-    <ds:schemaRef ds:uri="http://schemas.openxmlformats.org/package/2006/metadata/core-properties"/>
-    <ds:schemaRef ds:uri="56123433-40cc-482a-838d-44eebed83084"/>
-    <ds:schemaRef ds:uri="http://purl.org/dc/elements/1.1/"/>
-    <ds:schemaRef ds:uri="http://purl.org/dc/dcmitype/"/>
-    <ds:schemaRef ds:uri="7d2247ee-dcae-49b5-8e6a-08fc19cc9b93"/>
-    <ds:schemaRef ds:uri="http://schemas.microsoft.com/office/2006/documentManagement/types"/>
-    <ds:schemaRef ds:uri="http://schemas.microsoft.com/office/2006/metadata/properties"/>
-    <ds:schemaRef ds:uri="http://www.w3.org/XML/1998/namespace"/>
-    <ds:schemaRef ds:uri="http://purl.org/dc/terms/"/>
+    <ds:schemaRef ds:uri="http://schemas.microsoft.com/sharepoint/v3/contenttype/forms"/>
   </ds:schemaRefs>
 </ds:datastoreItem>
 </file>
@@ -6439,9 +6430,18 @@
 </file>
 
 <file path=customXml/itemProps3.xml><?xml version="1.0" encoding="utf-8"?>
-<ds:datastoreItem xmlns:ds="http://schemas.openxmlformats.org/officeDocument/2006/customXml" ds:itemID="{D03F60F6-267C-4F0B-90AC-53495EF22DB8}">
+<ds:datastoreItem xmlns:ds="http://schemas.openxmlformats.org/officeDocument/2006/customXml" ds:itemID="{19C64E80-8200-4669-BC3C-EA57A9064010}">
   <ds:schemaRefs>
-    <ds:schemaRef ds:uri="http://schemas.microsoft.com/sharepoint/v3/contenttype/forms"/>
+    <ds:schemaRef ds:uri="http://schemas.microsoft.com/office/infopath/2007/PartnerControls"/>
+    <ds:schemaRef ds:uri="http://schemas.openxmlformats.org/package/2006/metadata/core-properties"/>
+    <ds:schemaRef ds:uri="56123433-40cc-482a-838d-44eebed83084"/>
+    <ds:schemaRef ds:uri="http://purl.org/dc/elements/1.1/"/>
+    <ds:schemaRef ds:uri="http://purl.org/dc/dcmitype/"/>
+    <ds:schemaRef ds:uri="7d2247ee-dcae-49b5-8e6a-08fc19cc9b93"/>
+    <ds:schemaRef ds:uri="http://schemas.microsoft.com/office/2006/documentManagement/types"/>
+    <ds:schemaRef ds:uri="http://schemas.microsoft.com/office/2006/metadata/properties"/>
+    <ds:schemaRef ds:uri="http://www.w3.org/XML/1998/namespace"/>
+    <ds:schemaRef ds:uri="http://purl.org/dc/terms/"/>
   </ds:schemaRefs>
 </ds:datastoreItem>
 </file>
</xml_diff>